<commit_message>
update csv to ppt in python
</commit_message>
<xml_diff>
--- a/Dev/dataframe_to_ppt/presentacion.pptx
+++ b/Dev/dataframe_to_ppt/presentacion.pptx
@@ -3106,7 +3106,7 @@
           <a:lstStyle/>
           <a:p>
             <a:r>
-              <a:t>Sprint X</a:t>
+              <a:t>&lt;b&gt;Sprint X&lt;/b&gt;</a:t>
             </a:r>
           </a:p>
         </p:txBody>
@@ -3118,16 +3118,57 @@
             <a:spLocks noGrp="1"/>
           </p:cNvSpPr>
           <p:nvPr>
-            <p:ph idx="1"/>
-          </p:nvPr>
-        </p:nvSpPr>
-        <p:spPr/>
-        <p:txBody>
-          <a:bodyPr/>
-          <a:lstStyle/>
-          <a:p>
-            <a:r>
-              <a:t>name: CA, importe: 52000, moneda: USD</a:t>
+            <p:ph idx="1" sz="half"/>
+          </p:nvPr>
+        </p:nvSpPr>
+        <p:spPr/>
+        <p:txBody>
+          <a:bodyPr/>
+          <a:lstStyle/>
+          <a:p>
+            <a:r>
+              <a:t>Ana camnionera</a:t>
+            </a:r>
+          </a:p>
+          <a:p>
+            <a:pPr lvl="1"/>
+            <a:r>
+              <a:t>Importe : 52000</a:t>
+            </a:r>
+            <a:br/>
+            <a:r>
+              <a:t>Moneda : USD</a:t>
+            </a:r>
+          </a:p>
+        </p:txBody>
+      </p:sp>
+      <p:sp>
+        <p:nvSpPr>
+          <p:cNvPr id="4" name="Content Placeholder 3"/>
+          <p:cNvSpPr>
+            <a:spLocks noGrp="1"/>
+          </p:cNvSpPr>
+          <p:nvPr>
+            <p:ph idx="2" sz="half"/>
+          </p:nvPr>
+        </p:nvSpPr>
+        <p:spPr/>
+        <p:txBody>
+          <a:bodyPr/>
+          <a:lstStyle/>
+          <a:p>
+            <a:r>
+              <a:t>Beto albañil</a:t>
+            </a:r>
+          </a:p>
+          <a:p>
+            <a:pPr lvl="1"/>
+            <a:r>
+              <a:t>Importe : 99999</a:t>
+            </a:r>
+            <a:br/>
+            <a:r>
+              <a:t>Moneda : DXc</a:t>
             </a:r>
           </a:p>
         </p:txBody>
@@ -3166,7 +3207,7 @@
           <a:lstStyle/>
           <a:p>
             <a:r>
-              <a:t>Sprint X</a:t>
+              <a:t>&lt;b&gt;Sprint X&lt;/b&gt;</a:t>
             </a:r>
           </a:p>
         </p:txBody>
@@ -3178,16 +3219,57 @@
             <a:spLocks noGrp="1"/>
           </p:cNvSpPr>
           <p:nvPr>
-            <p:ph idx="1"/>
-          </p:nvPr>
-        </p:nvSpPr>
-        <p:spPr/>
-        <p:txBody>
-          <a:bodyPr/>
-          <a:lstStyle/>
-          <a:p>
-            <a:r>
-              <a:t>name: CUS, importe: 2300, moneda: ARS</a:t>
+            <p:ph idx="1" sz="half"/>
+          </p:nvPr>
+        </p:nvSpPr>
+        <p:spPr/>
+        <p:txBody>
+          <a:bodyPr/>
+          <a:lstStyle/>
+          <a:p>
+            <a:r>
+              <a:t>Beto carnicero</a:t>
+            </a:r>
+          </a:p>
+          <a:p>
+            <a:pPr lvl="1"/>
+            <a:r>
+              <a:t>Importe : 55555</a:t>
+            </a:r>
+            <a:br/>
+            <a:r>
+              <a:t>Moneda : COL</a:t>
+            </a:r>
+          </a:p>
+        </p:txBody>
+      </p:sp>
+      <p:sp>
+        <p:nvSpPr>
+          <p:cNvPr id="4" name="Content Placeholder 3"/>
+          <p:cNvSpPr>
+            <a:spLocks noGrp="1"/>
+          </p:cNvSpPr>
+          <p:nvPr>
+            <p:ph idx="2" sz="half"/>
+          </p:nvPr>
+        </p:nvSpPr>
+        <p:spPr/>
+        <p:txBody>
+          <a:bodyPr/>
+          <a:lstStyle/>
+          <a:p>
+            <a:r>
+              <a:t>Ana Matahambre</a:t>
+            </a:r>
+          </a:p>
+          <a:p>
+            <a:pPr lvl="1"/>
+            <a:r>
+              <a:t>Importe : 2300</a:t>
+            </a:r>
+            <a:br/>
+            <a:r>
+              <a:t>Moneda : ARS</a:t>
             </a:r>
           </a:p>
         </p:txBody>
@@ -3226,7 +3308,7 @@
           <a:lstStyle/>
           <a:p>
             <a:r>
-              <a:t>Sprint X</a:t>
+              <a:t>&lt;b&gt;Sprint X&lt;/b&gt;</a:t>
             </a:r>
           </a:p>
         </p:txBody>
@@ -3238,18 +3320,45 @@
             <a:spLocks noGrp="1"/>
           </p:cNvSpPr>
           <p:nvPr>
-            <p:ph idx="1"/>
-          </p:nvPr>
-        </p:nvSpPr>
-        <p:spPr/>
-        <p:txBody>
-          <a:bodyPr/>
-          <a:lstStyle/>
-          <a:p>
-            <a:r>
-              <a:t>name: OB, importe: 99999, moneda: COL</a:t>
-            </a:r>
-          </a:p>
+            <p:ph idx="1" sz="half"/>
+          </p:nvPr>
+        </p:nvSpPr>
+        <p:spPr/>
+        <p:txBody>
+          <a:bodyPr/>
+          <a:lstStyle/>
+          <a:p>
+            <a:r>
+              <a:t>Beto Doctor 45</a:t>
+            </a:r>
+          </a:p>
+          <a:p>
+            <a:pPr lvl="1"/>
+            <a:r>
+              <a:t>Importe : 33333</a:t>
+            </a:r>
+            <a:br/>
+            <a:r>
+              <a:t>Moneda : PLIN</a:t>
+            </a:r>
+          </a:p>
+        </p:txBody>
+      </p:sp>
+      <p:sp>
+        <p:nvSpPr>
+          <p:cNvPr id="4" name="Content Placeholder 3"/>
+          <p:cNvSpPr>
+            <a:spLocks noGrp="1"/>
+          </p:cNvSpPr>
+          <p:nvPr>
+            <p:ph idx="2" sz="half"/>
+          </p:nvPr>
+        </p:nvSpPr>
+        <p:spPr/>
+        <p:txBody>
+          <a:bodyPr/>
+          <a:lstStyle/>
+          <a:p/>
         </p:txBody>
       </p:sp>
     </p:spTree>

</xml_diff>